<commit_message>
Update of the final presentation file of the work
</commit_message>
<xml_diff>
--- a/Complejidad_Presentacion_TF.pptx
+++ b/Complejidad_Presentacion_TF.pptx
@@ -10249,8 +10249,8 @@
         </p:nvSpPr>
         <p:spPr>
           <a:xfrm>
-            <a:off x="5506316" y="2331778"/>
-            <a:ext cx="3399479" cy="606600"/>
+            <a:off x="4870526" y="2331775"/>
+            <a:ext cx="4035300" cy="606600"/>
           </a:xfrm>
           <a:prstGeom prst="rect">
             <a:avLst/>
@@ -21635,8 +21635,8 @@
         </p:nvSpPr>
         <p:spPr>
           <a:xfrm>
-            <a:off x="5387663" y="2887345"/>
-            <a:ext cx="3463800" cy="2103900"/>
+            <a:off x="5000026" y="2887350"/>
+            <a:ext cx="3851400" cy="2103900"/>
           </a:xfrm>
           <a:prstGeom prst="rect">
             <a:avLst/>
@@ -22048,8 +22048,8 @@
         </p:nvSpPr>
         <p:spPr>
           <a:xfrm>
-            <a:off x="7487425" y="1401596"/>
-            <a:ext cx="1364156" cy="379591"/>
+            <a:off x="6437970" y="1401600"/>
+            <a:ext cx="2413500" cy="379800"/>
           </a:xfrm>
           <a:prstGeom prst="rect">
             <a:avLst/>
@@ -22372,7 +22372,7 @@
                 <a:cs typeface="Arial"/>
                 <a:sym typeface="Arial"/>
               </a:rPr>
-              <a:t>ALGORITMO DFS (Depth Firts Search)</a:t>
+              <a:t>ALGORITMO DFS (Depth First Search)</a:t>
             </a:r>
             <a:endParaRPr/>
           </a:p>
@@ -22466,8 +22466,8 @@
         </p:nvSpPr>
         <p:spPr>
           <a:xfrm>
-            <a:off x="311700" y="366583"/>
-            <a:ext cx="8520600" cy="606600"/>
+            <a:off x="387075" y="142994"/>
+            <a:ext cx="8520600" cy="1048800"/>
           </a:xfrm>
           <a:prstGeom prst="rect">
             <a:avLst/>
@@ -22510,7 +22510,19 @@
                 <a:cs typeface="Arial"/>
                 <a:sym typeface="Arial"/>
               </a:rPr>
-              <a:t>ALGORITMO DE DIJKSTRA EMPLEANDO LISTAS</a:t>
+              <a:t>ALGORITMO DE DIJKSTRA EMPLEANDO </a:t>
+            </a:r>
+            <a:r>
+              <a:rPr b="1" lang="es-PE">
+                <a:solidFill>
+                  <a:srgbClr val="C9D1D9"/>
+                </a:solidFill>
+                <a:latin typeface="Arial"/>
+                <a:ea typeface="Arial"/>
+                <a:cs typeface="Arial"/>
+                <a:sym typeface="Arial"/>
+              </a:rPr>
+              <a:t>DICCIONARIOS</a:t>
             </a:r>
             <a:endParaRPr/>
           </a:p>
@@ -22747,8 +22759,8 @@
         </p:nvSpPr>
         <p:spPr>
           <a:xfrm>
-            <a:off x="311700" y="366583"/>
-            <a:ext cx="8520600" cy="606600"/>
+            <a:off x="311700" y="115545"/>
+            <a:ext cx="8520600" cy="1008300"/>
           </a:xfrm>
           <a:prstGeom prst="rect">
             <a:avLst/>
@@ -23734,6 +23746,18 @@
               <a:buNone/>
             </a:pPr>
             <a:r>
+              <a:rPr b="1" lang="es-PE">
+                <a:solidFill>
+                  <a:srgbClr val="C9D1D9"/>
+                </a:solidFill>
+                <a:latin typeface="Arial"/>
+                <a:ea typeface="Arial"/>
+                <a:cs typeface="Arial"/>
+                <a:sym typeface="Arial"/>
+              </a:rPr>
+              <a:t>Í</a:t>
+            </a:r>
+            <a:r>
               <a:rPr b="1" i="0" lang="es-PE">
                 <a:solidFill>
                   <a:srgbClr val="C9D1D9"/>
@@ -23743,7 +23767,7 @@
                 <a:cs typeface="Arial"/>
                 <a:sym typeface="Arial"/>
               </a:rPr>
-              <a:t>INDICE</a:t>
+              <a:t>NDICE</a:t>
             </a:r>
             <a:endParaRPr>
               <a:latin typeface="Arial"/>
@@ -23956,8 +23980,8 @@
         </p:nvSpPr>
         <p:spPr>
           <a:xfrm>
-            <a:off x="758229" y="3116003"/>
-            <a:ext cx="1482833" cy="534213"/>
+            <a:off x="758225" y="3116000"/>
+            <a:ext cx="2025900" cy="534300"/>
           </a:xfrm>
           <a:prstGeom prst="rect">
             <a:avLst/>
@@ -23993,7 +24017,7 @@
                 <a:cs typeface="Arial"/>
                 <a:sym typeface="Arial"/>
               </a:rPr>
-              <a:t>Algoritmo de Dijkstra con listas</a:t>
+              <a:t>Algoritmo de Dijkstra con diccionarios</a:t>
             </a:r>
             <a:endParaRPr b="1" sz="1400">
               <a:latin typeface="Arial"/>
@@ -24014,8 +24038,8 @@
         </p:nvSpPr>
         <p:spPr>
           <a:xfrm>
-            <a:off x="796027" y="1420558"/>
-            <a:ext cx="1512423" cy="457077"/>
+            <a:off x="796025" y="1420550"/>
+            <a:ext cx="1791000" cy="457200"/>
           </a:xfrm>
           <a:prstGeom prst="rect">
             <a:avLst/>
@@ -24076,8 +24100,8 @@
         </p:nvSpPr>
         <p:spPr>
           <a:xfrm>
-            <a:off x="758229" y="2691683"/>
-            <a:ext cx="1251033" cy="307355"/>
+            <a:off x="758225" y="2691675"/>
+            <a:ext cx="1592700" cy="307500"/>
           </a:xfrm>
           <a:prstGeom prst="rect">
             <a:avLst/>
@@ -24136,7 +24160,7 @@
         </p:nvSpPr>
         <p:spPr>
           <a:xfrm>
-            <a:off x="2438203" y="2639445"/>
+            <a:off x="2494940" y="2527895"/>
             <a:ext cx="428915" cy="428530"/>
           </a:xfrm>
           <a:custGeom>
@@ -24356,7 +24380,7 @@
         </p:nvGrpSpPr>
         <p:grpSpPr>
           <a:xfrm>
-            <a:off x="2494939" y="1345759"/>
+            <a:off x="2494938" y="1436096"/>
             <a:ext cx="428915" cy="426116"/>
             <a:chOff x="6226275" y="3911538"/>
             <a:chExt cx="900325" cy="894450"/>
@@ -25215,7 +25239,7 @@
         </p:nvSpPr>
         <p:spPr>
           <a:xfrm>
-            <a:off x="2449941" y="1950494"/>
+            <a:off x="2494929" y="1939381"/>
             <a:ext cx="428938" cy="428938"/>
           </a:xfrm>
           <a:custGeom>
@@ -25615,7 +25639,7 @@
         </p:nvSpPr>
         <p:spPr>
           <a:xfrm>
-            <a:off x="2402701" y="3327988"/>
+            <a:off x="2773201" y="3197888"/>
             <a:ext cx="476178" cy="282154"/>
           </a:xfrm>
           <a:custGeom>
@@ -25780,7 +25804,7 @@
         </p:nvSpPr>
         <p:spPr>
           <a:xfrm>
-            <a:off x="2351082" y="3815045"/>
+            <a:off x="2061982" y="3728657"/>
             <a:ext cx="432968" cy="433836"/>
           </a:xfrm>
           <a:custGeom>
@@ -25895,8 +25919,8 @@
         </p:nvSpPr>
         <p:spPr>
           <a:xfrm>
-            <a:off x="758229" y="2091268"/>
-            <a:ext cx="1232803" cy="302850"/>
+            <a:off x="758224" y="2091275"/>
+            <a:ext cx="1592700" cy="303000"/>
           </a:xfrm>
           <a:prstGeom prst="rect">
             <a:avLst/>
@@ -26084,7 +26108,7 @@
         </p:blipFill>
         <p:spPr>
           <a:xfrm>
-            <a:off x="2256710" y="4335632"/>
+            <a:off x="2181335" y="4240857"/>
             <a:ext cx="667144" cy="667144"/>
           </a:xfrm>
           <a:prstGeom prst="rect">

</xml_diff>